<commit_message>
added w and bw
</commit_message>
<xml_diff>
--- a/Industrial Control.pptx
+++ b/Industrial Control.pptx
@@ -8100,7 +8100,7 @@
         </p:nvSpPr>
         <p:spPr>
           <a:xfrm>
-            <a:off x="2356545" y="4764937"/>
+            <a:off x="1280811" y="4762853"/>
             <a:ext cx="4262105" cy="1030654"/>
           </a:xfrm>
           <a:custGeom>
@@ -8152,7 +8152,7 @@
         </p:nvSpPr>
         <p:spPr>
           <a:xfrm>
-            <a:off x="2356545" y="6468616"/>
+            <a:off x="6420547" y="4762323"/>
             <a:ext cx="1961453" cy="1030654"/>
           </a:xfrm>
           <a:custGeom>
@@ -8204,7 +8204,7 @@
         </p:nvSpPr>
         <p:spPr>
           <a:xfrm>
-            <a:off x="4601355" y="6468616"/>
+            <a:off x="1280811" y="6375845"/>
             <a:ext cx="2017295" cy="1030654"/>
           </a:xfrm>
           <a:custGeom>
@@ -8256,7 +8256,7 @@
         </p:nvSpPr>
         <p:spPr>
           <a:xfrm>
-            <a:off x="2595307" y="8175872"/>
+            <a:off x="4834056" y="6355557"/>
             <a:ext cx="1483927" cy="1030654"/>
           </a:xfrm>
           <a:custGeom>
@@ -8565,6 +8565,84 @@
           </a:p>
         </p:txBody>
       </p:sp>
+      <p:pic>
+        <p:nvPicPr>
+          <p:cNvPr id="13" name="Elemento grafico 12">
+            <a:extLst>
+              <a:ext uri="{FF2B5EF4-FFF2-40B4-BE49-F238E27FC236}">
+                <a16:creationId xmlns:a16="http://schemas.microsoft.com/office/drawing/2014/main" id="{53130F6E-8039-F526-824C-FD160E96C8CF}"/>
+              </a:ext>
+            </a:extLst>
+          </p:cNvPr>
+          <p:cNvPicPr>
+            <a:picLocks noChangeAspect="1"/>
+          </p:cNvPicPr>
+          <p:nvPr/>
+        </p:nvPicPr>
+        <p:blipFill>
+          <a:blip r:embed="rId15">
+            <a:extLst>
+              <a:ext uri="{28A0092B-C50C-407E-A947-70E740481C1C}">
+                <a14:useLocalDpi xmlns:a14="http://schemas.microsoft.com/office/drawing/2010/main" val="0"/>
+              </a:ext>
+              <a:ext uri="{96DAC541-7B7A-43D3-8B79-37D633B846F1}">
+                <asvg:svgBlip xmlns:asvg="http://schemas.microsoft.com/office/drawing/2016/SVG/main" r:embed="rId16"/>
+              </a:ext>
+            </a:extLst>
+          </a:blip>
+          <a:stretch>
+            <a:fillRect/>
+          </a:stretch>
+        </p:blipFill>
+        <p:spPr>
+          <a:xfrm>
+            <a:off x="1280811" y="8119164"/>
+            <a:ext cx="1438122" cy="1030654"/>
+          </a:xfrm>
+          <a:prstGeom prst="rect">
+            <a:avLst/>
+          </a:prstGeom>
+        </p:spPr>
+      </p:pic>
+      <p:pic>
+        <p:nvPicPr>
+          <p:cNvPr id="18" name="Elemento grafico 17">
+            <a:extLst>
+              <a:ext uri="{FF2B5EF4-FFF2-40B4-BE49-F238E27FC236}">
+                <a16:creationId xmlns:a16="http://schemas.microsoft.com/office/drawing/2014/main" id="{FD98EF45-2DB1-F7AB-0DAB-AA7C75218F5C}"/>
+              </a:ext>
+            </a:extLst>
+          </p:cNvPr>
+          <p:cNvPicPr>
+            <a:picLocks noChangeAspect="1"/>
+          </p:cNvPicPr>
+          <p:nvPr/>
+        </p:nvPicPr>
+        <p:blipFill>
+          <a:blip r:embed="rId17">
+            <a:extLst>
+              <a:ext uri="{28A0092B-C50C-407E-A947-70E740481C1C}">
+                <a14:useLocalDpi xmlns:a14="http://schemas.microsoft.com/office/drawing/2010/main" val="0"/>
+              </a:ext>
+              <a:ext uri="{96DAC541-7B7A-43D3-8B79-37D633B846F1}">
+                <asvg:svgBlip xmlns:asvg="http://schemas.microsoft.com/office/drawing/2016/SVG/main" r:embed="rId18"/>
+              </a:ext>
+            </a:extLst>
+          </a:blip>
+          <a:stretch>
+            <a:fillRect/>
+          </a:stretch>
+        </p:blipFill>
+        <p:spPr>
+          <a:xfrm>
+            <a:off x="3115086" y="7993136"/>
+            <a:ext cx="5266914" cy="1065828"/>
+          </a:xfrm>
+          <a:prstGeom prst="rect">
+            <a:avLst/>
+          </a:prstGeom>
+        </p:spPr>
+      </p:pic>
     </p:spTree>
   </p:cSld>
   <p:clrMapOvr>

</xml_diff>